<commit_message>
draft presentation updated and file structure tidied
draft presentation updated and file structure tidied
</commit_message>
<xml_diff>
--- a/visit_scotland_presentation.pptx
+++ b/visit_scotland_presentation.pptx
@@ -5,21 +5,27 @@
     <p:sldMasterId id="2147483801" r:id="rId1"/>
   </p:sldMasterIdLst>
   <p:notesMasterIdLst>
-    <p:notesMasterId r:id="rId14"/>
+    <p:notesMasterId r:id="rId20"/>
   </p:notesMasterIdLst>
   <p:sldIdLst>
     <p:sldId id="256" r:id="rId2"/>
     <p:sldId id="271" r:id="rId3"/>
     <p:sldId id="257" r:id="rId4"/>
-    <p:sldId id="259" r:id="rId5"/>
-    <p:sldId id="261" r:id="rId6"/>
-    <p:sldId id="263" r:id="rId7"/>
-    <p:sldId id="265" r:id="rId8"/>
-    <p:sldId id="267" r:id="rId9"/>
-    <p:sldId id="269" r:id="rId10"/>
-    <p:sldId id="272" r:id="rId11"/>
-    <p:sldId id="274" r:id="rId12"/>
-    <p:sldId id="275" r:id="rId13"/>
+    <p:sldId id="276" r:id="rId5"/>
+    <p:sldId id="259" r:id="rId6"/>
+    <p:sldId id="277" r:id="rId7"/>
+    <p:sldId id="261" r:id="rId8"/>
+    <p:sldId id="263" r:id="rId9"/>
+    <p:sldId id="278" r:id="rId10"/>
+    <p:sldId id="265" r:id="rId11"/>
+    <p:sldId id="279" r:id="rId12"/>
+    <p:sldId id="280" r:id="rId13"/>
+    <p:sldId id="281" r:id="rId14"/>
+    <p:sldId id="267" r:id="rId15"/>
+    <p:sldId id="269" r:id="rId16"/>
+    <p:sldId id="272" r:id="rId17"/>
+    <p:sldId id="274" r:id="rId18"/>
+    <p:sldId id="275" r:id="rId19"/>
   </p:sldIdLst>
   <p:sldSz cx="12192000" cy="6858000"/>
   <p:notesSz cx="6858000" cy="9144000"/>
@@ -606,13 +612,19 @@
           <a:p>
             <a:r>
               <a:rPr lang="en-US" dirty="0"/>
-              <a:t>Answer to Q:</a:t>
+              <a:t>Answer to question:</a:t>
             </a:r>
           </a:p>
           <a:p>
             <a:r>
               <a:rPr lang="en-US" sz="1200" dirty="0"/>
-              <a:t>Is there any way to predict spending and visits for Visit Scotland?</a:t>
+              <a:t>Is there a particular key demographic of visitors we should be focusing on? Who spends the most? Who visits the most?</a:t>
+            </a:r>
+          </a:p>
+          <a:p>
+            <a:r>
+              <a:rPr lang="en-US" sz="1200" dirty="0"/>
+              <a:t>When looking at regional tourism, what insights can we gain? Where are our visitors from? How do they differ in the money they spend, nights they spend in Scotland, or number of visits they do?</a:t>
             </a:r>
             <a:endParaRPr lang="en-US" dirty="0"/>
           </a:p>
@@ -644,7 +656,7 @@
     </p:spTree>
     <p:extLst>
       <p:ext uri="{BB962C8B-B14F-4D97-AF65-F5344CB8AC3E}">
-        <p14:creationId xmlns:p14="http://schemas.microsoft.com/office/powerpoint/2010/main" val="1445134492"/>
+        <p14:creationId xmlns:p14="http://schemas.microsoft.com/office/powerpoint/2010/main" val="4126452344"/>
       </p:ext>
     </p:extLst>
   </p:cSld>
@@ -700,13 +712,19 @@
           <a:p>
             <a:r>
               <a:rPr lang="en-US" dirty="0"/>
-              <a:t>Answer to Q:</a:t>
+              <a:t>Answer to question:</a:t>
             </a:r>
           </a:p>
           <a:p>
             <a:r>
               <a:rPr lang="en-US" sz="1200" dirty="0"/>
-              <a:t>Is there any way to predict spending and visits for Visit Scotland?</a:t>
+              <a:t>Is there a particular key demographic of visitors we should be focusing on? Who spends the most? Who visits the most?</a:t>
+            </a:r>
+          </a:p>
+          <a:p>
+            <a:r>
+              <a:rPr lang="en-US" sz="1200" dirty="0"/>
+              <a:t>When looking at regional tourism, what insights can we gain? Where are our visitors from? How do they differ in the money they spend, nights they spend in Scotland, or number of visits they do?</a:t>
             </a:r>
             <a:endParaRPr lang="en-US" dirty="0"/>
           </a:p>
@@ -738,7 +756,7 @@
     </p:spTree>
     <p:extLst>
       <p:ext uri="{BB962C8B-B14F-4D97-AF65-F5344CB8AC3E}">
-        <p14:creationId xmlns:p14="http://schemas.microsoft.com/office/powerpoint/2010/main" val="4008326389"/>
+        <p14:creationId xmlns:p14="http://schemas.microsoft.com/office/powerpoint/2010/main" val="772051525"/>
       </p:ext>
     </p:extLst>
   </p:cSld>
@@ -794,13 +812,19 @@
           <a:p>
             <a:r>
               <a:rPr lang="en-US" dirty="0"/>
-              <a:t>Answer to Q:</a:t>
+              <a:t>Answer to question:</a:t>
             </a:r>
           </a:p>
           <a:p>
             <a:r>
               <a:rPr lang="en-US" sz="1200" dirty="0"/>
-              <a:t>Is there any way to predict spending and visits for Visit Scotland?</a:t>
+              <a:t>Is there a particular key demographic of visitors we should be focusing on? Who spends the most? Who visits the most?</a:t>
+            </a:r>
+          </a:p>
+          <a:p>
+            <a:r>
+              <a:rPr lang="en-US" sz="1200" dirty="0"/>
+              <a:t>When looking at regional tourism, what insights can we gain? Where are our visitors from? How do they differ in the money they spend, nights they spend in Scotland, or number of visits they do?</a:t>
             </a:r>
             <a:endParaRPr lang="en-US" dirty="0"/>
           </a:p>
@@ -824,6 +848,576 @@
             <a:fld id="{FD410758-F3B9-454D-81B2-002CA45DB04C}" type="slidenum">
               <a:rPr lang="en-US" smtClean="0"/>
               <a:t>12</a:t>
+            </a:fld>
+            <a:endParaRPr lang="en-US"/>
+          </a:p>
+        </p:txBody>
+      </p:sp>
+    </p:spTree>
+    <p:extLst>
+      <p:ext uri="{BB962C8B-B14F-4D97-AF65-F5344CB8AC3E}">
+        <p14:creationId xmlns:p14="http://schemas.microsoft.com/office/powerpoint/2010/main" val="255976082"/>
+      </p:ext>
+    </p:extLst>
+  </p:cSld>
+  <p:clrMapOvr>
+    <a:masterClrMapping/>
+  </p:clrMapOvr>
+</p:notes>
+</file>
+
+<file path=ppt/notesSlides/notesSlide13.xml><?xml version="1.0" encoding="utf-8"?>
+<p:notes xmlns:a="http://schemas.openxmlformats.org/drawingml/2006/main" xmlns:r="http://schemas.openxmlformats.org/officeDocument/2006/relationships" xmlns:p="http://schemas.openxmlformats.org/presentationml/2006/main">
+  <p:cSld>
+    <p:spTree>
+      <p:nvGrpSpPr>
+        <p:cNvPr id="1" name=""/>
+        <p:cNvGrpSpPr/>
+        <p:nvPr/>
+      </p:nvGrpSpPr>
+      <p:grpSpPr>
+        <a:xfrm>
+          <a:off x="0" y="0"/>
+          <a:ext cx="0" cy="0"/>
+          <a:chOff x="0" y="0"/>
+          <a:chExt cx="0" cy="0"/>
+        </a:xfrm>
+      </p:grpSpPr>
+      <p:sp>
+        <p:nvSpPr>
+          <p:cNvPr id="2" name="Slide Image Placeholder 1"/>
+          <p:cNvSpPr>
+            <a:spLocks noGrp="1" noRot="1" noChangeAspect="1"/>
+          </p:cNvSpPr>
+          <p:nvPr>
+            <p:ph type="sldImg"/>
+          </p:nvPr>
+        </p:nvSpPr>
+        <p:spPr/>
+      </p:sp>
+      <p:sp>
+        <p:nvSpPr>
+          <p:cNvPr id="3" name="Notes Placeholder 2"/>
+          <p:cNvSpPr>
+            <a:spLocks noGrp="1"/>
+          </p:cNvSpPr>
+          <p:nvPr>
+            <p:ph type="body" idx="1"/>
+          </p:nvPr>
+        </p:nvSpPr>
+        <p:spPr/>
+        <p:txBody>
+          <a:bodyPr/>
+          <a:lstStyle/>
+          <a:p>
+            <a:r>
+              <a:rPr lang="en-US" dirty="0"/>
+              <a:t>Answer to question:</a:t>
+            </a:r>
+          </a:p>
+          <a:p>
+            <a:r>
+              <a:rPr lang="en-US" sz="1200" dirty="0"/>
+              <a:t>Is there a particular key demographic of visitors we should be focusing on? Who spends the most? Who visits the most?</a:t>
+            </a:r>
+          </a:p>
+          <a:p>
+            <a:r>
+              <a:rPr lang="en-US" sz="1200" dirty="0"/>
+              <a:t>When looking at regional tourism, what insights can we gain? Where are our visitors from? How do they differ in the money they spend, nights they spend in Scotland, or number of visits they do?</a:t>
+            </a:r>
+            <a:endParaRPr lang="en-US" dirty="0"/>
+          </a:p>
+        </p:txBody>
+      </p:sp>
+      <p:sp>
+        <p:nvSpPr>
+          <p:cNvPr id="4" name="Slide Number Placeholder 3"/>
+          <p:cNvSpPr>
+            <a:spLocks noGrp="1"/>
+          </p:cNvSpPr>
+          <p:nvPr>
+            <p:ph type="sldNum" sz="quarter" idx="5"/>
+          </p:nvPr>
+        </p:nvSpPr>
+        <p:spPr/>
+        <p:txBody>
+          <a:bodyPr/>
+          <a:lstStyle/>
+          <a:p>
+            <a:fld id="{FD410758-F3B9-454D-81B2-002CA45DB04C}" type="slidenum">
+              <a:rPr lang="en-US" smtClean="0"/>
+              <a:t>13</a:t>
+            </a:fld>
+            <a:endParaRPr lang="en-US"/>
+          </a:p>
+        </p:txBody>
+      </p:sp>
+    </p:spTree>
+    <p:extLst>
+      <p:ext uri="{BB962C8B-B14F-4D97-AF65-F5344CB8AC3E}">
+        <p14:creationId xmlns:p14="http://schemas.microsoft.com/office/powerpoint/2010/main" val="1834328566"/>
+      </p:ext>
+    </p:extLst>
+  </p:cSld>
+  <p:clrMapOvr>
+    <a:masterClrMapping/>
+  </p:clrMapOvr>
+</p:notes>
+</file>
+
+<file path=ppt/notesSlides/notesSlide14.xml><?xml version="1.0" encoding="utf-8"?>
+<p:notes xmlns:a="http://schemas.openxmlformats.org/drawingml/2006/main" xmlns:r="http://schemas.openxmlformats.org/officeDocument/2006/relationships" xmlns:p="http://schemas.openxmlformats.org/presentationml/2006/main">
+  <p:cSld>
+    <p:spTree>
+      <p:nvGrpSpPr>
+        <p:cNvPr id="1" name=""/>
+        <p:cNvGrpSpPr/>
+        <p:nvPr/>
+      </p:nvGrpSpPr>
+      <p:grpSpPr>
+        <a:xfrm>
+          <a:off x="0" y="0"/>
+          <a:ext cx="0" cy="0"/>
+          <a:chOff x="0" y="0"/>
+          <a:chExt cx="0" cy="0"/>
+        </a:xfrm>
+      </p:grpSpPr>
+      <p:sp>
+        <p:nvSpPr>
+          <p:cNvPr id="2" name="Slide Image Placeholder 1"/>
+          <p:cNvSpPr>
+            <a:spLocks noGrp="1" noRot="1" noChangeAspect="1"/>
+          </p:cNvSpPr>
+          <p:nvPr>
+            <p:ph type="sldImg"/>
+          </p:nvPr>
+        </p:nvSpPr>
+        <p:spPr/>
+      </p:sp>
+      <p:sp>
+        <p:nvSpPr>
+          <p:cNvPr id="3" name="Notes Placeholder 2"/>
+          <p:cNvSpPr>
+            <a:spLocks noGrp="1"/>
+          </p:cNvSpPr>
+          <p:nvPr>
+            <p:ph type="body" idx="1"/>
+          </p:nvPr>
+        </p:nvSpPr>
+        <p:spPr/>
+        <p:txBody>
+          <a:bodyPr/>
+          <a:lstStyle/>
+          <a:p>
+            <a:r>
+              <a:rPr lang="en-US" dirty="0"/>
+              <a:t>Answer to q:</a:t>
+            </a:r>
+          </a:p>
+          <a:p>
+            <a:r>
+              <a:rPr lang="en-US" sz="1200" dirty="0"/>
+              <a:t>How have general tourism rates changed over time?</a:t>
+            </a:r>
+            <a:endParaRPr lang="en-US" dirty="0"/>
+          </a:p>
+        </p:txBody>
+      </p:sp>
+      <p:sp>
+        <p:nvSpPr>
+          <p:cNvPr id="4" name="Slide Number Placeholder 3"/>
+          <p:cNvSpPr>
+            <a:spLocks noGrp="1"/>
+          </p:cNvSpPr>
+          <p:nvPr>
+            <p:ph type="sldNum" sz="quarter" idx="5"/>
+          </p:nvPr>
+        </p:nvSpPr>
+        <p:spPr/>
+        <p:txBody>
+          <a:bodyPr/>
+          <a:lstStyle/>
+          <a:p>
+            <a:fld id="{FD410758-F3B9-454D-81B2-002CA45DB04C}" type="slidenum">
+              <a:rPr lang="en-US" smtClean="0"/>
+              <a:t>14</a:t>
+            </a:fld>
+            <a:endParaRPr lang="en-US"/>
+          </a:p>
+        </p:txBody>
+      </p:sp>
+    </p:spTree>
+    <p:extLst>
+      <p:ext uri="{BB962C8B-B14F-4D97-AF65-F5344CB8AC3E}">
+        <p14:creationId xmlns:p14="http://schemas.microsoft.com/office/powerpoint/2010/main" val="1590350423"/>
+      </p:ext>
+    </p:extLst>
+  </p:cSld>
+  <p:clrMapOvr>
+    <a:masterClrMapping/>
+  </p:clrMapOvr>
+</p:notes>
+</file>
+
+<file path=ppt/notesSlides/notesSlide15.xml><?xml version="1.0" encoding="utf-8"?>
+<p:notes xmlns:a="http://schemas.openxmlformats.org/drawingml/2006/main" xmlns:r="http://schemas.openxmlformats.org/officeDocument/2006/relationships" xmlns:p="http://schemas.openxmlformats.org/presentationml/2006/main">
+  <p:cSld>
+    <p:spTree>
+      <p:nvGrpSpPr>
+        <p:cNvPr id="1" name=""/>
+        <p:cNvGrpSpPr/>
+        <p:nvPr/>
+      </p:nvGrpSpPr>
+      <p:grpSpPr>
+        <a:xfrm>
+          <a:off x="0" y="0"/>
+          <a:ext cx="0" cy="0"/>
+          <a:chOff x="0" y="0"/>
+          <a:chExt cx="0" cy="0"/>
+        </a:xfrm>
+      </p:grpSpPr>
+      <p:sp>
+        <p:nvSpPr>
+          <p:cNvPr id="2" name="Slide Image Placeholder 1"/>
+          <p:cNvSpPr>
+            <a:spLocks noGrp="1" noRot="1" noChangeAspect="1"/>
+          </p:cNvSpPr>
+          <p:nvPr>
+            <p:ph type="sldImg"/>
+          </p:nvPr>
+        </p:nvSpPr>
+        <p:spPr/>
+      </p:sp>
+      <p:sp>
+        <p:nvSpPr>
+          <p:cNvPr id="3" name="Notes Placeholder 2"/>
+          <p:cNvSpPr>
+            <a:spLocks noGrp="1"/>
+          </p:cNvSpPr>
+          <p:nvPr>
+            <p:ph type="body" idx="1"/>
+          </p:nvPr>
+        </p:nvSpPr>
+        <p:spPr/>
+        <p:txBody>
+          <a:bodyPr/>
+          <a:lstStyle/>
+          <a:p>
+            <a:r>
+              <a:rPr lang="en-US" dirty="0"/>
+              <a:t>Answer to Q:</a:t>
+            </a:r>
+          </a:p>
+          <a:p>
+            <a:r>
+              <a:rPr lang="en-US" sz="1200" dirty="0"/>
+              <a:t>Is there any way to predict spending and visits for Visit Scotland?</a:t>
+            </a:r>
+            <a:endParaRPr lang="en-US" dirty="0"/>
+          </a:p>
+        </p:txBody>
+      </p:sp>
+      <p:sp>
+        <p:nvSpPr>
+          <p:cNvPr id="4" name="Slide Number Placeholder 3"/>
+          <p:cNvSpPr>
+            <a:spLocks noGrp="1"/>
+          </p:cNvSpPr>
+          <p:nvPr>
+            <p:ph type="sldNum" sz="quarter" idx="5"/>
+          </p:nvPr>
+        </p:nvSpPr>
+        <p:spPr/>
+        <p:txBody>
+          <a:bodyPr/>
+          <a:lstStyle/>
+          <a:p>
+            <a:fld id="{FD410758-F3B9-454D-81B2-002CA45DB04C}" type="slidenum">
+              <a:rPr lang="en-US" smtClean="0"/>
+              <a:t>15</a:t>
+            </a:fld>
+            <a:endParaRPr lang="en-US"/>
+          </a:p>
+        </p:txBody>
+      </p:sp>
+    </p:spTree>
+    <p:extLst>
+      <p:ext uri="{BB962C8B-B14F-4D97-AF65-F5344CB8AC3E}">
+        <p14:creationId xmlns:p14="http://schemas.microsoft.com/office/powerpoint/2010/main" val="862993618"/>
+      </p:ext>
+    </p:extLst>
+  </p:cSld>
+  <p:clrMapOvr>
+    <a:masterClrMapping/>
+  </p:clrMapOvr>
+</p:notes>
+</file>
+
+<file path=ppt/notesSlides/notesSlide16.xml><?xml version="1.0" encoding="utf-8"?>
+<p:notes xmlns:a="http://schemas.openxmlformats.org/drawingml/2006/main" xmlns:r="http://schemas.openxmlformats.org/officeDocument/2006/relationships" xmlns:p="http://schemas.openxmlformats.org/presentationml/2006/main">
+  <p:cSld>
+    <p:spTree>
+      <p:nvGrpSpPr>
+        <p:cNvPr id="1" name=""/>
+        <p:cNvGrpSpPr/>
+        <p:nvPr/>
+      </p:nvGrpSpPr>
+      <p:grpSpPr>
+        <a:xfrm>
+          <a:off x="0" y="0"/>
+          <a:ext cx="0" cy="0"/>
+          <a:chOff x="0" y="0"/>
+          <a:chExt cx="0" cy="0"/>
+        </a:xfrm>
+      </p:grpSpPr>
+      <p:sp>
+        <p:nvSpPr>
+          <p:cNvPr id="2" name="Slide Image Placeholder 1"/>
+          <p:cNvSpPr>
+            <a:spLocks noGrp="1" noRot="1" noChangeAspect="1"/>
+          </p:cNvSpPr>
+          <p:nvPr>
+            <p:ph type="sldImg"/>
+          </p:nvPr>
+        </p:nvSpPr>
+        <p:spPr/>
+      </p:sp>
+      <p:sp>
+        <p:nvSpPr>
+          <p:cNvPr id="3" name="Notes Placeholder 2"/>
+          <p:cNvSpPr>
+            <a:spLocks noGrp="1"/>
+          </p:cNvSpPr>
+          <p:nvPr>
+            <p:ph type="body" idx="1"/>
+          </p:nvPr>
+        </p:nvSpPr>
+        <p:spPr/>
+        <p:txBody>
+          <a:bodyPr/>
+          <a:lstStyle/>
+          <a:p>
+            <a:r>
+              <a:rPr lang="en-US" dirty="0"/>
+              <a:t>Answer to Q:</a:t>
+            </a:r>
+          </a:p>
+          <a:p>
+            <a:r>
+              <a:rPr lang="en-US" sz="1200" dirty="0"/>
+              <a:t>Is there any way to predict spending and visits for Visit Scotland?</a:t>
+            </a:r>
+            <a:endParaRPr lang="en-US" dirty="0"/>
+          </a:p>
+        </p:txBody>
+      </p:sp>
+      <p:sp>
+        <p:nvSpPr>
+          <p:cNvPr id="4" name="Slide Number Placeholder 3"/>
+          <p:cNvSpPr>
+            <a:spLocks noGrp="1"/>
+          </p:cNvSpPr>
+          <p:nvPr>
+            <p:ph type="sldNum" sz="quarter" idx="5"/>
+          </p:nvPr>
+        </p:nvSpPr>
+        <p:spPr/>
+        <p:txBody>
+          <a:bodyPr/>
+          <a:lstStyle/>
+          <a:p>
+            <a:fld id="{FD410758-F3B9-454D-81B2-002CA45DB04C}" type="slidenum">
+              <a:rPr lang="en-US" smtClean="0"/>
+              <a:t>16</a:t>
+            </a:fld>
+            <a:endParaRPr lang="en-US"/>
+          </a:p>
+        </p:txBody>
+      </p:sp>
+    </p:spTree>
+    <p:extLst>
+      <p:ext uri="{BB962C8B-B14F-4D97-AF65-F5344CB8AC3E}">
+        <p14:creationId xmlns:p14="http://schemas.microsoft.com/office/powerpoint/2010/main" val="1445134492"/>
+      </p:ext>
+    </p:extLst>
+  </p:cSld>
+  <p:clrMapOvr>
+    <a:masterClrMapping/>
+  </p:clrMapOvr>
+</p:notes>
+</file>
+
+<file path=ppt/notesSlides/notesSlide17.xml><?xml version="1.0" encoding="utf-8"?>
+<p:notes xmlns:a="http://schemas.openxmlformats.org/drawingml/2006/main" xmlns:r="http://schemas.openxmlformats.org/officeDocument/2006/relationships" xmlns:p="http://schemas.openxmlformats.org/presentationml/2006/main">
+  <p:cSld>
+    <p:spTree>
+      <p:nvGrpSpPr>
+        <p:cNvPr id="1" name=""/>
+        <p:cNvGrpSpPr/>
+        <p:nvPr/>
+      </p:nvGrpSpPr>
+      <p:grpSpPr>
+        <a:xfrm>
+          <a:off x="0" y="0"/>
+          <a:ext cx="0" cy="0"/>
+          <a:chOff x="0" y="0"/>
+          <a:chExt cx="0" cy="0"/>
+        </a:xfrm>
+      </p:grpSpPr>
+      <p:sp>
+        <p:nvSpPr>
+          <p:cNvPr id="2" name="Slide Image Placeholder 1"/>
+          <p:cNvSpPr>
+            <a:spLocks noGrp="1" noRot="1" noChangeAspect="1"/>
+          </p:cNvSpPr>
+          <p:nvPr>
+            <p:ph type="sldImg"/>
+          </p:nvPr>
+        </p:nvSpPr>
+        <p:spPr/>
+      </p:sp>
+      <p:sp>
+        <p:nvSpPr>
+          <p:cNvPr id="3" name="Notes Placeholder 2"/>
+          <p:cNvSpPr>
+            <a:spLocks noGrp="1"/>
+          </p:cNvSpPr>
+          <p:nvPr>
+            <p:ph type="body" idx="1"/>
+          </p:nvPr>
+        </p:nvSpPr>
+        <p:spPr/>
+        <p:txBody>
+          <a:bodyPr/>
+          <a:lstStyle/>
+          <a:p>
+            <a:r>
+              <a:rPr lang="en-US" dirty="0"/>
+              <a:t>Answer to Q:</a:t>
+            </a:r>
+          </a:p>
+          <a:p>
+            <a:r>
+              <a:rPr lang="en-US" sz="1200" dirty="0"/>
+              <a:t>Is there any way to predict spending and visits for Visit Scotland?</a:t>
+            </a:r>
+            <a:endParaRPr lang="en-US" dirty="0"/>
+          </a:p>
+        </p:txBody>
+      </p:sp>
+      <p:sp>
+        <p:nvSpPr>
+          <p:cNvPr id="4" name="Slide Number Placeholder 3"/>
+          <p:cNvSpPr>
+            <a:spLocks noGrp="1"/>
+          </p:cNvSpPr>
+          <p:nvPr>
+            <p:ph type="sldNum" sz="quarter" idx="5"/>
+          </p:nvPr>
+        </p:nvSpPr>
+        <p:spPr/>
+        <p:txBody>
+          <a:bodyPr/>
+          <a:lstStyle/>
+          <a:p>
+            <a:fld id="{FD410758-F3B9-454D-81B2-002CA45DB04C}" type="slidenum">
+              <a:rPr lang="en-US" smtClean="0"/>
+              <a:t>17</a:t>
+            </a:fld>
+            <a:endParaRPr lang="en-US"/>
+          </a:p>
+        </p:txBody>
+      </p:sp>
+    </p:spTree>
+    <p:extLst>
+      <p:ext uri="{BB962C8B-B14F-4D97-AF65-F5344CB8AC3E}">
+        <p14:creationId xmlns:p14="http://schemas.microsoft.com/office/powerpoint/2010/main" val="4008326389"/>
+      </p:ext>
+    </p:extLst>
+  </p:cSld>
+  <p:clrMapOvr>
+    <a:masterClrMapping/>
+  </p:clrMapOvr>
+</p:notes>
+</file>
+
+<file path=ppt/notesSlides/notesSlide18.xml><?xml version="1.0" encoding="utf-8"?>
+<p:notes xmlns:a="http://schemas.openxmlformats.org/drawingml/2006/main" xmlns:r="http://schemas.openxmlformats.org/officeDocument/2006/relationships" xmlns:p="http://schemas.openxmlformats.org/presentationml/2006/main">
+  <p:cSld>
+    <p:spTree>
+      <p:nvGrpSpPr>
+        <p:cNvPr id="1" name=""/>
+        <p:cNvGrpSpPr/>
+        <p:nvPr/>
+      </p:nvGrpSpPr>
+      <p:grpSpPr>
+        <a:xfrm>
+          <a:off x="0" y="0"/>
+          <a:ext cx="0" cy="0"/>
+          <a:chOff x="0" y="0"/>
+          <a:chExt cx="0" cy="0"/>
+        </a:xfrm>
+      </p:grpSpPr>
+      <p:sp>
+        <p:nvSpPr>
+          <p:cNvPr id="2" name="Slide Image Placeholder 1"/>
+          <p:cNvSpPr>
+            <a:spLocks noGrp="1" noRot="1" noChangeAspect="1"/>
+          </p:cNvSpPr>
+          <p:nvPr>
+            <p:ph type="sldImg"/>
+          </p:nvPr>
+        </p:nvSpPr>
+        <p:spPr/>
+      </p:sp>
+      <p:sp>
+        <p:nvSpPr>
+          <p:cNvPr id="3" name="Notes Placeholder 2"/>
+          <p:cNvSpPr>
+            <a:spLocks noGrp="1"/>
+          </p:cNvSpPr>
+          <p:nvPr>
+            <p:ph type="body" idx="1"/>
+          </p:nvPr>
+        </p:nvSpPr>
+        <p:spPr/>
+        <p:txBody>
+          <a:bodyPr/>
+          <a:lstStyle/>
+          <a:p>
+            <a:r>
+              <a:rPr lang="en-US" dirty="0"/>
+              <a:t>Answer to Q:</a:t>
+            </a:r>
+          </a:p>
+          <a:p>
+            <a:r>
+              <a:rPr lang="en-US" sz="1200" dirty="0"/>
+              <a:t>Is there any way to predict spending and visits for Visit Scotland?</a:t>
+            </a:r>
+            <a:endParaRPr lang="en-US" dirty="0"/>
+          </a:p>
+        </p:txBody>
+      </p:sp>
+      <p:sp>
+        <p:nvSpPr>
+          <p:cNvPr id="4" name="Slide Number Placeholder 3"/>
+          <p:cNvSpPr>
+            <a:spLocks noGrp="1"/>
+          </p:cNvSpPr>
+          <p:nvPr>
+            <p:ph type="sldNum" sz="quarter" idx="5"/>
+          </p:nvPr>
+        </p:nvSpPr>
+        <p:spPr/>
+        <p:txBody>
+          <a:bodyPr/>
+          <a:lstStyle/>
+          <a:p>
+            <a:fld id="{FD410758-F3B9-454D-81B2-002CA45DB04C}" type="slidenum">
+              <a:rPr lang="en-US" smtClean="0"/>
+              <a:t>18</a:t>
             </a:fld>
             <a:endParaRPr lang="en-US"/>
           </a:p>
@@ -1089,7 +1683,7 @@
           <a:p>
             <a:r>
               <a:rPr lang="en-US" sz="1200" dirty="0"/>
-              <a:t>What type of locations receive the most visits? What kinds of locations do people spend the most in?</a:t>
+              <a:t>Is there a particular method of travel our visitors arrive by? Some of our locations are remote and not easily accessible by public transport, so this would be good information to have.</a:t>
             </a:r>
             <a:endParaRPr lang="en-US" dirty="0"/>
           </a:p>
@@ -1121,7 +1715,7 @@
     </p:spTree>
     <p:extLst>
       <p:ext uri="{BB962C8B-B14F-4D97-AF65-F5344CB8AC3E}">
-        <p14:creationId xmlns:p14="http://schemas.microsoft.com/office/powerpoint/2010/main" val="1519833189"/>
+        <p14:creationId xmlns:p14="http://schemas.microsoft.com/office/powerpoint/2010/main" val="4204189730"/>
       </p:ext>
     </p:extLst>
   </p:cSld>
@@ -1177,20 +1771,13 @@
           <a:p>
             <a:r>
               <a:rPr lang="en-US" dirty="0"/>
-              <a:t>Answer to questions:</a:t>
+              <a:t>Answer to question:</a:t>
             </a:r>
           </a:p>
           <a:p>
             <a:r>
               <a:rPr lang="en-US" sz="1200" dirty="0"/>
-              <a:t>What kind of tourism activity generates the highest income for Scotland?</a:t>
-            </a:r>
-            <a:br>
-              <a:rPr lang="en-US" sz="1200" dirty="0"/>
-            </a:br>
-            <a:r>
-              <a:rPr lang="en-US" sz="1200" dirty="0"/>
-              <a:t>Which kind of activity generates the most visits to sites?</a:t>
+              <a:t>What type of locations receive the most visits? What kinds of locations do people spend the most in?</a:t>
             </a:r>
             <a:endParaRPr lang="en-US" dirty="0"/>
           </a:p>
@@ -1222,7 +1809,7 @@
     </p:spTree>
     <p:extLst>
       <p:ext uri="{BB962C8B-B14F-4D97-AF65-F5344CB8AC3E}">
-        <p14:creationId xmlns:p14="http://schemas.microsoft.com/office/powerpoint/2010/main" val="2559054262"/>
+        <p14:creationId xmlns:p14="http://schemas.microsoft.com/office/powerpoint/2010/main" val="1519833189"/>
       </p:ext>
     </p:extLst>
   </p:cSld>
@@ -1278,21 +1865,13 @@
           <a:p>
             <a:r>
               <a:rPr lang="en-US" dirty="0"/>
-              <a:t>Answer to Q:</a:t>
+              <a:t>Answer to question:</a:t>
             </a:r>
           </a:p>
           <a:p>
             <a:r>
               <a:rPr lang="en-US" sz="1200" dirty="0"/>
-              <a:t>What type of </a:t>
-            </a:r>
-            <a:r>
-              <a:rPr lang="en-US" sz="1200" dirty="0" err="1"/>
-              <a:t>accomodation</a:t>
-            </a:r>
-            <a:r>
-              <a:rPr lang="en-US" sz="1200" dirty="0"/>
-              <a:t> is most popular? Is there a difference by location?</a:t>
+              <a:t>What type of locations receive the most visits? What kinds of locations do people spend the most in?</a:t>
             </a:r>
             <a:endParaRPr lang="en-US" dirty="0"/>
           </a:p>
@@ -1324,7 +1903,7 @@
     </p:spTree>
     <p:extLst>
       <p:ext uri="{BB962C8B-B14F-4D97-AF65-F5344CB8AC3E}">
-        <p14:creationId xmlns:p14="http://schemas.microsoft.com/office/powerpoint/2010/main" val="2036907532"/>
+        <p14:creationId xmlns:p14="http://schemas.microsoft.com/office/powerpoint/2010/main" val="514322435"/>
       </p:ext>
     </p:extLst>
   </p:cSld>
@@ -1380,19 +1959,20 @@
           <a:p>
             <a:r>
               <a:rPr lang="en-US" dirty="0"/>
-              <a:t>Answer to question:</a:t>
+              <a:t>Answer to questions:</a:t>
             </a:r>
           </a:p>
           <a:p>
             <a:r>
               <a:rPr lang="en-US" sz="1200" dirty="0"/>
-              <a:t>Is there a particular key demographic of visitors we should be focusing on? Who spends the most? Who visits the most?</a:t>
-            </a:r>
-          </a:p>
-          <a:p>
-            <a:r>
+              <a:t>What kind of tourism activity generates the highest income for Scotland?</a:t>
+            </a:r>
+            <a:br>
               <a:rPr lang="en-US" sz="1200" dirty="0"/>
-              <a:t>When looking at regional tourism, what insights can we gain? Where are our visitors from? How do they differ in the money they spend, nights they spend in Scotland, or number of visits they do?</a:t>
+            </a:br>
+            <a:r>
+              <a:rPr lang="en-US" sz="1200" dirty="0"/>
+              <a:t>Which kind of activity generates the most visits to sites?</a:t>
             </a:r>
             <a:endParaRPr lang="en-US" dirty="0"/>
           </a:p>
@@ -1424,7 +2004,7 @@
     </p:spTree>
     <p:extLst>
       <p:ext uri="{BB962C8B-B14F-4D97-AF65-F5344CB8AC3E}">
-        <p14:creationId xmlns:p14="http://schemas.microsoft.com/office/powerpoint/2010/main" val="4126452344"/>
+        <p14:creationId xmlns:p14="http://schemas.microsoft.com/office/powerpoint/2010/main" val="2559054262"/>
       </p:ext>
     </p:extLst>
   </p:cSld>
@@ -1480,13 +2060,21 @@
           <a:p>
             <a:r>
               <a:rPr lang="en-US" dirty="0"/>
-              <a:t>Answer to q:</a:t>
+              <a:t>Answer to Q:</a:t>
             </a:r>
           </a:p>
           <a:p>
             <a:r>
               <a:rPr lang="en-US" sz="1200" dirty="0"/>
-              <a:t>How have general tourism rates changed over time?</a:t>
+              <a:t>What type of </a:t>
+            </a:r>
+            <a:r>
+              <a:rPr lang="en-US" sz="1200" dirty="0" err="1"/>
+              <a:t>accomodation</a:t>
+            </a:r>
+            <a:r>
+              <a:rPr lang="en-US" sz="1200" dirty="0"/>
+              <a:t> is most popular? Is there a difference by location?</a:t>
             </a:r>
             <a:endParaRPr lang="en-US" dirty="0"/>
           </a:p>
@@ -1518,7 +2106,7 @@
     </p:spTree>
     <p:extLst>
       <p:ext uri="{BB962C8B-B14F-4D97-AF65-F5344CB8AC3E}">
-        <p14:creationId xmlns:p14="http://schemas.microsoft.com/office/powerpoint/2010/main" val="1590350423"/>
+        <p14:creationId xmlns:p14="http://schemas.microsoft.com/office/powerpoint/2010/main" val="2036907532"/>
       </p:ext>
     </p:extLst>
   </p:cSld>
@@ -1580,7 +2168,15 @@
           <a:p>
             <a:r>
               <a:rPr lang="en-US" sz="1200" dirty="0"/>
-              <a:t>Is there any way to predict spending and visits for Visit Scotland?</a:t>
+              <a:t>What type of </a:t>
+            </a:r>
+            <a:r>
+              <a:rPr lang="en-US" sz="1200" dirty="0" err="1"/>
+              <a:t>accomodation</a:t>
+            </a:r>
+            <a:r>
+              <a:rPr lang="en-US" sz="1200" dirty="0"/>
+              <a:t> is most popular? Is there a difference by location?</a:t>
             </a:r>
             <a:endParaRPr lang="en-US" dirty="0"/>
           </a:p>
@@ -1612,7 +2208,7 @@
     </p:spTree>
     <p:extLst>
       <p:ext uri="{BB962C8B-B14F-4D97-AF65-F5344CB8AC3E}">
-        <p14:creationId xmlns:p14="http://schemas.microsoft.com/office/powerpoint/2010/main" val="862993618"/>
+        <p14:creationId xmlns:p14="http://schemas.microsoft.com/office/powerpoint/2010/main" val="4188394541"/>
       </p:ext>
     </p:extLst>
   </p:cSld>
@@ -5019,19 +5615,26 @@
         </p:nvSpPr>
         <p:spPr>
           <a:xfrm>
-            <a:off x="1069848" y="1298448"/>
-            <a:ext cx="7315200" cy="914400"/>
+            <a:off x="1069848" y="1298447"/>
+            <a:ext cx="7315200" cy="1351447"/>
           </a:xfrm>
         </p:spPr>
         <p:txBody>
           <a:bodyPr>
-            <a:noAutofit/>
+            <a:normAutofit fontScale="90000"/>
           </a:bodyPr>
           <a:lstStyle/>
           <a:p>
             <a:r>
-              <a:rPr lang="en-US" sz="4400" dirty="0"/>
-              <a:t>Recommendations to company</a:t>
+              <a:rPr lang="en-US" dirty="0"/>
+              <a:t>Demographic</a:t>
+            </a:r>
+            <a:br>
+              <a:rPr lang="en-US" dirty="0"/>
+            </a:br>
+            <a:r>
+              <a:rPr lang="en-US" sz="4000" dirty="0"/>
+              <a:t>Who are the people visiting  Scotland?</a:t>
             </a:r>
           </a:p>
         </p:txBody>
@@ -5061,10 +5664,40 @@
           </a:p>
         </p:txBody>
       </p:sp>
+      <p:pic>
+        <p:nvPicPr>
+          <p:cNvPr id="4" name="Picture 3">
+            <a:extLst>
+              <a:ext uri="{FF2B5EF4-FFF2-40B4-BE49-F238E27FC236}">
+                <a16:creationId xmlns:a16="http://schemas.microsoft.com/office/drawing/2014/main" id="{1F6B2368-17CD-F546-B61D-6D02E23B8B29}"/>
+              </a:ext>
+            </a:extLst>
+          </p:cNvPr>
+          <p:cNvPicPr>
+            <a:picLocks noChangeAspect="1"/>
+          </p:cNvPicPr>
+          <p:nvPr/>
+        </p:nvPicPr>
+        <p:blipFill>
+          <a:blip r:embed="rId3"/>
+          <a:stretch>
+            <a:fillRect/>
+          </a:stretch>
+        </p:blipFill>
+        <p:spPr>
+          <a:xfrm>
+            <a:off x="2228570" y="2649894"/>
+            <a:ext cx="5058089" cy="3120250"/>
+          </a:xfrm>
+          <a:prstGeom prst="rect">
+            <a:avLst/>
+          </a:prstGeom>
+        </p:spPr>
+      </p:pic>
     </p:spTree>
     <p:extLst>
       <p:ext uri="{BB962C8B-B14F-4D97-AF65-F5344CB8AC3E}">
-        <p14:creationId xmlns:p14="http://schemas.microsoft.com/office/powerpoint/2010/main" val="536200534"/>
+        <p14:creationId xmlns:p14="http://schemas.microsoft.com/office/powerpoint/2010/main" val="576864141"/>
       </p:ext>
     </p:extLst>
   </p:cSld>
@@ -5115,6 +5748,833 @@
         </p:spPr>
         <p:txBody>
           <a:bodyPr>
+            <a:normAutofit/>
+          </a:bodyPr>
+          <a:lstStyle/>
+          <a:p>
+            <a:r>
+              <a:rPr lang="en-US" dirty="0"/>
+              <a:t>Demographic</a:t>
+            </a:r>
+            <a:endParaRPr lang="en-US" sz="4000" dirty="0"/>
+          </a:p>
+        </p:txBody>
+      </p:sp>
+      <p:sp>
+        <p:nvSpPr>
+          <p:cNvPr id="3" name="Subtitle 2">
+            <a:extLst>
+              <a:ext uri="{FF2B5EF4-FFF2-40B4-BE49-F238E27FC236}">
+                <a16:creationId xmlns:a16="http://schemas.microsoft.com/office/drawing/2014/main" id="{F2AB0476-65A6-144D-9D00-6F94D146DCD2}"/>
+              </a:ext>
+            </a:extLst>
+          </p:cNvPr>
+          <p:cNvSpPr>
+            <a:spLocks noGrp="1"/>
+          </p:cNvSpPr>
+          <p:nvPr>
+            <p:ph type="subTitle" idx="1"/>
+          </p:nvPr>
+        </p:nvSpPr>
+        <p:spPr/>
+        <p:txBody>
+          <a:bodyPr/>
+          <a:lstStyle/>
+          <a:p>
+            <a:endParaRPr lang="en-US"/>
+          </a:p>
+        </p:txBody>
+      </p:sp>
+      <p:pic>
+        <p:nvPicPr>
+          <p:cNvPr id="5" name="Picture 4">
+            <a:extLst>
+              <a:ext uri="{FF2B5EF4-FFF2-40B4-BE49-F238E27FC236}">
+                <a16:creationId xmlns:a16="http://schemas.microsoft.com/office/drawing/2014/main" id="{85B0613B-9C93-9841-8BC8-434D5B6CBE84}"/>
+              </a:ext>
+            </a:extLst>
+          </p:cNvPr>
+          <p:cNvPicPr>
+            <a:picLocks noChangeAspect="1"/>
+          </p:cNvPicPr>
+          <p:nvPr/>
+        </p:nvPicPr>
+        <p:blipFill>
+          <a:blip r:embed="rId3"/>
+          <a:stretch>
+            <a:fillRect/>
+          </a:stretch>
+        </p:blipFill>
+        <p:spPr>
+          <a:xfrm>
+            <a:off x="1069848" y="2543302"/>
+            <a:ext cx="4889500" cy="3016250"/>
+          </a:xfrm>
+          <a:prstGeom prst="rect">
+            <a:avLst/>
+          </a:prstGeom>
+        </p:spPr>
+      </p:pic>
+      <p:pic>
+        <p:nvPicPr>
+          <p:cNvPr id="6" name="Picture 5">
+            <a:extLst>
+              <a:ext uri="{FF2B5EF4-FFF2-40B4-BE49-F238E27FC236}">
+                <a16:creationId xmlns:a16="http://schemas.microsoft.com/office/drawing/2014/main" id="{6FEA0154-4C20-6143-B9CD-BBBC11A1C974}"/>
+              </a:ext>
+            </a:extLst>
+          </p:cNvPr>
+          <p:cNvPicPr>
+            <a:picLocks noChangeAspect="1"/>
+          </p:cNvPicPr>
+          <p:nvPr/>
+        </p:nvPicPr>
+        <p:blipFill>
+          <a:blip r:embed="rId4"/>
+          <a:stretch>
+            <a:fillRect/>
+          </a:stretch>
+        </p:blipFill>
+        <p:spPr>
+          <a:xfrm>
+            <a:off x="6606812" y="2543301"/>
+            <a:ext cx="4889497" cy="3016249"/>
+          </a:xfrm>
+          <a:prstGeom prst="rect">
+            <a:avLst/>
+          </a:prstGeom>
+        </p:spPr>
+      </p:pic>
+    </p:spTree>
+    <p:extLst>
+      <p:ext uri="{BB962C8B-B14F-4D97-AF65-F5344CB8AC3E}">
+        <p14:creationId xmlns:p14="http://schemas.microsoft.com/office/powerpoint/2010/main" val="1538173131"/>
+      </p:ext>
+    </p:extLst>
+  </p:cSld>
+  <p:clrMapOvr>
+    <a:masterClrMapping/>
+  </p:clrMapOvr>
+</p:sld>
+</file>
+
+<file path=ppt/slides/slide12.xml><?xml version="1.0" encoding="utf-8"?>
+<p:sld xmlns:a="http://schemas.openxmlformats.org/drawingml/2006/main" xmlns:r="http://schemas.openxmlformats.org/officeDocument/2006/relationships" xmlns:p="http://schemas.openxmlformats.org/presentationml/2006/main">
+  <p:cSld>
+    <p:spTree>
+      <p:nvGrpSpPr>
+        <p:cNvPr id="1" name=""/>
+        <p:cNvGrpSpPr/>
+        <p:nvPr/>
+      </p:nvGrpSpPr>
+      <p:grpSpPr>
+        <a:xfrm>
+          <a:off x="0" y="0"/>
+          <a:ext cx="0" cy="0"/>
+          <a:chOff x="0" y="0"/>
+          <a:chExt cx="0" cy="0"/>
+        </a:xfrm>
+      </p:grpSpPr>
+      <p:sp>
+        <p:nvSpPr>
+          <p:cNvPr id="2" name="Title 1">
+            <a:extLst>
+              <a:ext uri="{FF2B5EF4-FFF2-40B4-BE49-F238E27FC236}">
+                <a16:creationId xmlns:a16="http://schemas.microsoft.com/office/drawing/2014/main" id="{45A24646-3429-8847-A682-94E49DC8BB92}"/>
+              </a:ext>
+            </a:extLst>
+          </p:cNvPr>
+          <p:cNvSpPr>
+            <a:spLocks noGrp="1"/>
+          </p:cNvSpPr>
+          <p:nvPr>
+            <p:ph type="ctrTitle"/>
+          </p:nvPr>
+        </p:nvSpPr>
+        <p:spPr>
+          <a:xfrm>
+            <a:off x="1069848" y="1298448"/>
+            <a:ext cx="7315200" cy="914400"/>
+          </a:xfrm>
+        </p:spPr>
+        <p:txBody>
+          <a:bodyPr>
+            <a:normAutofit/>
+          </a:bodyPr>
+          <a:lstStyle/>
+          <a:p>
+            <a:r>
+              <a:rPr lang="en-US" dirty="0"/>
+              <a:t>Demographic</a:t>
+            </a:r>
+            <a:endParaRPr lang="en-US" sz="4000" dirty="0"/>
+          </a:p>
+        </p:txBody>
+      </p:sp>
+      <p:sp>
+        <p:nvSpPr>
+          <p:cNvPr id="3" name="Subtitle 2">
+            <a:extLst>
+              <a:ext uri="{FF2B5EF4-FFF2-40B4-BE49-F238E27FC236}">
+                <a16:creationId xmlns:a16="http://schemas.microsoft.com/office/drawing/2014/main" id="{F2AB0476-65A6-144D-9D00-6F94D146DCD2}"/>
+              </a:ext>
+            </a:extLst>
+          </p:cNvPr>
+          <p:cNvSpPr>
+            <a:spLocks noGrp="1"/>
+          </p:cNvSpPr>
+          <p:nvPr>
+            <p:ph type="subTitle" idx="1"/>
+          </p:nvPr>
+        </p:nvSpPr>
+        <p:spPr/>
+        <p:txBody>
+          <a:bodyPr/>
+          <a:lstStyle/>
+          <a:p>
+            <a:endParaRPr lang="en-US"/>
+          </a:p>
+        </p:txBody>
+      </p:sp>
+      <p:pic>
+        <p:nvPicPr>
+          <p:cNvPr id="5" name="Picture 4">
+            <a:extLst>
+              <a:ext uri="{FF2B5EF4-FFF2-40B4-BE49-F238E27FC236}">
+                <a16:creationId xmlns:a16="http://schemas.microsoft.com/office/drawing/2014/main" id="{85B0613B-9C93-9841-8BC8-434D5B6CBE84}"/>
+              </a:ext>
+            </a:extLst>
+          </p:cNvPr>
+          <p:cNvPicPr>
+            <a:picLocks noChangeAspect="1"/>
+          </p:cNvPicPr>
+          <p:nvPr/>
+        </p:nvPicPr>
+        <p:blipFill>
+          <a:blip r:embed="rId3"/>
+          <a:stretch>
+            <a:fillRect/>
+          </a:stretch>
+        </p:blipFill>
+        <p:spPr>
+          <a:xfrm>
+            <a:off x="1069848" y="2543302"/>
+            <a:ext cx="4889500" cy="3016250"/>
+          </a:xfrm>
+          <a:prstGeom prst="rect">
+            <a:avLst/>
+          </a:prstGeom>
+        </p:spPr>
+      </p:pic>
+      <p:pic>
+        <p:nvPicPr>
+          <p:cNvPr id="6" name="Picture 5">
+            <a:extLst>
+              <a:ext uri="{FF2B5EF4-FFF2-40B4-BE49-F238E27FC236}">
+                <a16:creationId xmlns:a16="http://schemas.microsoft.com/office/drawing/2014/main" id="{6FEA0154-4C20-6143-B9CD-BBBC11A1C974}"/>
+              </a:ext>
+            </a:extLst>
+          </p:cNvPr>
+          <p:cNvPicPr>
+            <a:picLocks noChangeAspect="1"/>
+          </p:cNvPicPr>
+          <p:nvPr/>
+        </p:nvPicPr>
+        <p:blipFill>
+          <a:blip r:embed="rId4"/>
+          <a:stretch>
+            <a:fillRect/>
+          </a:stretch>
+        </p:blipFill>
+        <p:spPr>
+          <a:xfrm>
+            <a:off x="6606812" y="2543301"/>
+            <a:ext cx="4889497" cy="3016249"/>
+          </a:xfrm>
+          <a:prstGeom prst="rect">
+            <a:avLst/>
+          </a:prstGeom>
+        </p:spPr>
+      </p:pic>
+    </p:spTree>
+    <p:extLst>
+      <p:ext uri="{BB962C8B-B14F-4D97-AF65-F5344CB8AC3E}">
+        <p14:creationId xmlns:p14="http://schemas.microsoft.com/office/powerpoint/2010/main" val="3941535775"/>
+      </p:ext>
+    </p:extLst>
+  </p:cSld>
+  <p:clrMapOvr>
+    <a:masterClrMapping/>
+  </p:clrMapOvr>
+</p:sld>
+</file>
+
+<file path=ppt/slides/slide13.xml><?xml version="1.0" encoding="utf-8"?>
+<p:sld xmlns:a="http://schemas.openxmlformats.org/drawingml/2006/main" xmlns:r="http://schemas.openxmlformats.org/officeDocument/2006/relationships" xmlns:p="http://schemas.openxmlformats.org/presentationml/2006/main">
+  <p:cSld>
+    <p:spTree>
+      <p:nvGrpSpPr>
+        <p:cNvPr id="1" name=""/>
+        <p:cNvGrpSpPr/>
+        <p:nvPr/>
+      </p:nvGrpSpPr>
+      <p:grpSpPr>
+        <a:xfrm>
+          <a:off x="0" y="0"/>
+          <a:ext cx="0" cy="0"/>
+          <a:chOff x="0" y="0"/>
+          <a:chExt cx="0" cy="0"/>
+        </a:xfrm>
+      </p:grpSpPr>
+      <p:sp>
+        <p:nvSpPr>
+          <p:cNvPr id="2" name="Title 1">
+            <a:extLst>
+              <a:ext uri="{FF2B5EF4-FFF2-40B4-BE49-F238E27FC236}">
+                <a16:creationId xmlns:a16="http://schemas.microsoft.com/office/drawing/2014/main" id="{45A24646-3429-8847-A682-94E49DC8BB92}"/>
+              </a:ext>
+            </a:extLst>
+          </p:cNvPr>
+          <p:cNvSpPr>
+            <a:spLocks noGrp="1"/>
+          </p:cNvSpPr>
+          <p:nvPr>
+            <p:ph type="ctrTitle"/>
+          </p:nvPr>
+        </p:nvSpPr>
+        <p:spPr>
+          <a:xfrm>
+            <a:off x="1069848" y="1298448"/>
+            <a:ext cx="7315200" cy="914400"/>
+          </a:xfrm>
+        </p:spPr>
+        <p:txBody>
+          <a:bodyPr>
+            <a:normAutofit fontScale="90000"/>
+          </a:bodyPr>
+          <a:lstStyle/>
+          <a:p>
+            <a:r>
+              <a:rPr lang="en-US" dirty="0"/>
+              <a:t>Demographic – by Region</a:t>
+            </a:r>
+            <a:endParaRPr lang="en-US" sz="4000" dirty="0"/>
+          </a:p>
+        </p:txBody>
+      </p:sp>
+      <p:sp>
+        <p:nvSpPr>
+          <p:cNvPr id="3" name="Subtitle 2">
+            <a:extLst>
+              <a:ext uri="{FF2B5EF4-FFF2-40B4-BE49-F238E27FC236}">
+                <a16:creationId xmlns:a16="http://schemas.microsoft.com/office/drawing/2014/main" id="{F2AB0476-65A6-144D-9D00-6F94D146DCD2}"/>
+              </a:ext>
+            </a:extLst>
+          </p:cNvPr>
+          <p:cNvSpPr>
+            <a:spLocks noGrp="1"/>
+          </p:cNvSpPr>
+          <p:nvPr>
+            <p:ph type="subTitle" idx="1"/>
+          </p:nvPr>
+        </p:nvSpPr>
+        <p:spPr/>
+        <p:txBody>
+          <a:bodyPr/>
+          <a:lstStyle/>
+          <a:p>
+            <a:endParaRPr lang="en-US" dirty="0"/>
+          </a:p>
+        </p:txBody>
+      </p:sp>
+      <p:pic>
+        <p:nvPicPr>
+          <p:cNvPr id="4" name="Picture 3">
+            <a:extLst>
+              <a:ext uri="{FF2B5EF4-FFF2-40B4-BE49-F238E27FC236}">
+                <a16:creationId xmlns:a16="http://schemas.microsoft.com/office/drawing/2014/main" id="{04805F9D-DB55-C349-82A8-CE0EDEF48228}"/>
+              </a:ext>
+            </a:extLst>
+          </p:cNvPr>
+          <p:cNvPicPr>
+            <a:picLocks noChangeAspect="1"/>
+          </p:cNvPicPr>
+          <p:nvPr/>
+        </p:nvPicPr>
+        <p:blipFill>
+          <a:blip r:embed="rId3"/>
+          <a:stretch>
+            <a:fillRect/>
+          </a:stretch>
+        </p:blipFill>
+        <p:spPr>
+          <a:xfrm>
+            <a:off x="1069849" y="2187755"/>
+            <a:ext cx="2994152" cy="1847042"/>
+          </a:xfrm>
+          <a:prstGeom prst="rect">
+            <a:avLst/>
+          </a:prstGeom>
+        </p:spPr>
+      </p:pic>
+      <p:pic>
+        <p:nvPicPr>
+          <p:cNvPr id="7" name="Picture 6">
+            <a:extLst>
+              <a:ext uri="{FF2B5EF4-FFF2-40B4-BE49-F238E27FC236}">
+                <a16:creationId xmlns:a16="http://schemas.microsoft.com/office/drawing/2014/main" id="{CBE93B6C-2DD9-5741-BE42-1F953A390BA6}"/>
+              </a:ext>
+            </a:extLst>
+          </p:cNvPr>
+          <p:cNvPicPr>
+            <a:picLocks noChangeAspect="1"/>
+          </p:cNvPicPr>
+          <p:nvPr/>
+        </p:nvPicPr>
+        <p:blipFill>
+          <a:blip r:embed="rId4"/>
+          <a:stretch>
+            <a:fillRect/>
+          </a:stretch>
+        </p:blipFill>
+        <p:spPr>
+          <a:xfrm>
+            <a:off x="8385048" y="2228308"/>
+            <a:ext cx="2994152" cy="1847042"/>
+          </a:xfrm>
+          <a:prstGeom prst="rect">
+            <a:avLst/>
+          </a:prstGeom>
+        </p:spPr>
+      </p:pic>
+      <p:pic>
+        <p:nvPicPr>
+          <p:cNvPr id="8" name="Picture 7">
+            <a:extLst>
+              <a:ext uri="{FF2B5EF4-FFF2-40B4-BE49-F238E27FC236}">
+                <a16:creationId xmlns:a16="http://schemas.microsoft.com/office/drawing/2014/main" id="{D3109D7C-1423-814A-864B-34CFAFA51B09}"/>
+              </a:ext>
+            </a:extLst>
+          </p:cNvPr>
+          <p:cNvPicPr>
+            <a:picLocks noChangeAspect="1"/>
+          </p:cNvPicPr>
+          <p:nvPr/>
+        </p:nvPicPr>
+        <p:blipFill>
+          <a:blip r:embed="rId5"/>
+          <a:stretch>
+            <a:fillRect/>
+          </a:stretch>
+        </p:blipFill>
+        <p:spPr>
+          <a:xfrm>
+            <a:off x="4727448" y="3111276"/>
+            <a:ext cx="3354638" cy="2069419"/>
+          </a:xfrm>
+          <a:prstGeom prst="rect">
+            <a:avLst/>
+          </a:prstGeom>
+        </p:spPr>
+      </p:pic>
+    </p:spTree>
+    <p:extLst>
+      <p:ext uri="{BB962C8B-B14F-4D97-AF65-F5344CB8AC3E}">
+        <p14:creationId xmlns:p14="http://schemas.microsoft.com/office/powerpoint/2010/main" val="3656076785"/>
+      </p:ext>
+    </p:extLst>
+  </p:cSld>
+  <p:clrMapOvr>
+    <a:masterClrMapping/>
+  </p:clrMapOvr>
+</p:sld>
+</file>
+
+<file path=ppt/slides/slide14.xml><?xml version="1.0" encoding="utf-8"?>
+<p:sld xmlns:a="http://schemas.openxmlformats.org/drawingml/2006/main" xmlns:r="http://schemas.openxmlformats.org/officeDocument/2006/relationships" xmlns:p="http://schemas.openxmlformats.org/presentationml/2006/main">
+  <p:cSld>
+    <p:spTree>
+      <p:nvGrpSpPr>
+        <p:cNvPr id="1" name=""/>
+        <p:cNvGrpSpPr/>
+        <p:nvPr/>
+      </p:nvGrpSpPr>
+      <p:grpSpPr>
+        <a:xfrm>
+          <a:off x="0" y="0"/>
+          <a:ext cx="0" cy="0"/>
+          <a:chOff x="0" y="0"/>
+          <a:chExt cx="0" cy="0"/>
+        </a:xfrm>
+      </p:grpSpPr>
+      <p:sp>
+        <p:nvSpPr>
+          <p:cNvPr id="2" name="Title 1">
+            <a:extLst>
+              <a:ext uri="{FF2B5EF4-FFF2-40B4-BE49-F238E27FC236}">
+                <a16:creationId xmlns:a16="http://schemas.microsoft.com/office/drawing/2014/main" id="{45A24646-3429-8847-A682-94E49DC8BB92}"/>
+              </a:ext>
+            </a:extLst>
+          </p:cNvPr>
+          <p:cNvSpPr>
+            <a:spLocks noGrp="1"/>
+          </p:cNvSpPr>
+          <p:nvPr>
+            <p:ph type="ctrTitle"/>
+          </p:nvPr>
+        </p:nvSpPr>
+        <p:spPr>
+          <a:xfrm>
+            <a:off x="1069848" y="1298448"/>
+            <a:ext cx="7315200" cy="1164834"/>
+          </a:xfrm>
+        </p:spPr>
+        <p:txBody>
+          <a:bodyPr>
+            <a:normAutofit fontScale="90000"/>
+          </a:bodyPr>
+          <a:lstStyle/>
+          <a:p>
+            <a:r>
+              <a:rPr lang="en-US" dirty="0"/>
+              <a:t>Time</a:t>
+            </a:r>
+            <a:br>
+              <a:rPr lang="en-US" dirty="0"/>
+            </a:br>
+            <a:r>
+              <a:rPr lang="en-US" sz="2400" dirty="0"/>
+              <a:t>How have visits and spend to Scotland changed over time?</a:t>
+            </a:r>
+          </a:p>
+        </p:txBody>
+      </p:sp>
+      <p:sp>
+        <p:nvSpPr>
+          <p:cNvPr id="3" name="Subtitle 2">
+            <a:extLst>
+              <a:ext uri="{FF2B5EF4-FFF2-40B4-BE49-F238E27FC236}">
+                <a16:creationId xmlns:a16="http://schemas.microsoft.com/office/drawing/2014/main" id="{F2AB0476-65A6-144D-9D00-6F94D146DCD2}"/>
+              </a:ext>
+            </a:extLst>
+          </p:cNvPr>
+          <p:cNvSpPr>
+            <a:spLocks noGrp="1"/>
+          </p:cNvSpPr>
+          <p:nvPr>
+            <p:ph type="subTitle" idx="1"/>
+          </p:nvPr>
+        </p:nvSpPr>
+        <p:spPr/>
+        <p:txBody>
+          <a:bodyPr/>
+          <a:lstStyle/>
+          <a:p>
+            <a:endParaRPr lang="en-US"/>
+          </a:p>
+        </p:txBody>
+      </p:sp>
+      <p:pic>
+        <p:nvPicPr>
+          <p:cNvPr id="4" name="Picture 3">
+            <a:extLst>
+              <a:ext uri="{FF2B5EF4-FFF2-40B4-BE49-F238E27FC236}">
+                <a16:creationId xmlns:a16="http://schemas.microsoft.com/office/drawing/2014/main" id="{BFFB4731-3F54-704B-8CBE-F127B93C7D55}"/>
+              </a:ext>
+            </a:extLst>
+          </p:cNvPr>
+          <p:cNvPicPr>
+            <a:picLocks noChangeAspect="1"/>
+          </p:cNvPicPr>
+          <p:nvPr/>
+        </p:nvPicPr>
+        <p:blipFill>
+          <a:blip r:embed="rId3"/>
+          <a:stretch>
+            <a:fillRect/>
+          </a:stretch>
+        </p:blipFill>
+        <p:spPr>
+          <a:xfrm>
+            <a:off x="1069848" y="2463282"/>
+            <a:ext cx="3421484" cy="2110656"/>
+          </a:xfrm>
+          <a:prstGeom prst="rect">
+            <a:avLst/>
+          </a:prstGeom>
+        </p:spPr>
+      </p:pic>
+      <p:pic>
+        <p:nvPicPr>
+          <p:cNvPr id="5" name="Picture 4">
+            <a:extLst>
+              <a:ext uri="{FF2B5EF4-FFF2-40B4-BE49-F238E27FC236}">
+                <a16:creationId xmlns:a16="http://schemas.microsoft.com/office/drawing/2014/main" id="{0E9EBC2E-FF63-9449-8CF3-979E3FD765FC}"/>
+              </a:ext>
+            </a:extLst>
+          </p:cNvPr>
+          <p:cNvPicPr>
+            <a:picLocks noChangeAspect="1"/>
+          </p:cNvPicPr>
+          <p:nvPr/>
+        </p:nvPicPr>
+        <p:blipFill>
+          <a:blip r:embed="rId4"/>
+          <a:stretch>
+            <a:fillRect/>
+          </a:stretch>
+        </p:blipFill>
+        <p:spPr>
+          <a:xfrm>
+            <a:off x="5463894" y="2463282"/>
+            <a:ext cx="3421485" cy="2110656"/>
+          </a:xfrm>
+          <a:prstGeom prst="rect">
+            <a:avLst/>
+          </a:prstGeom>
+        </p:spPr>
+      </p:pic>
+    </p:spTree>
+    <p:extLst>
+      <p:ext uri="{BB962C8B-B14F-4D97-AF65-F5344CB8AC3E}">
+        <p14:creationId xmlns:p14="http://schemas.microsoft.com/office/powerpoint/2010/main" val="2487231236"/>
+      </p:ext>
+    </p:extLst>
+  </p:cSld>
+  <p:clrMapOvr>
+    <a:masterClrMapping/>
+  </p:clrMapOvr>
+</p:sld>
+</file>
+
+<file path=ppt/slides/slide15.xml><?xml version="1.0" encoding="utf-8"?>
+<p:sld xmlns:a="http://schemas.openxmlformats.org/drawingml/2006/main" xmlns:r="http://schemas.openxmlformats.org/officeDocument/2006/relationships" xmlns:p="http://schemas.openxmlformats.org/presentationml/2006/main">
+  <p:cSld>
+    <p:spTree>
+      <p:nvGrpSpPr>
+        <p:cNvPr id="1" name=""/>
+        <p:cNvGrpSpPr/>
+        <p:nvPr/>
+      </p:nvGrpSpPr>
+      <p:grpSpPr>
+        <a:xfrm>
+          <a:off x="0" y="0"/>
+          <a:ext cx="0" cy="0"/>
+          <a:chOff x="0" y="0"/>
+          <a:chExt cx="0" cy="0"/>
+        </a:xfrm>
+      </p:grpSpPr>
+      <p:sp>
+        <p:nvSpPr>
+          <p:cNvPr id="2" name="Title 1">
+            <a:extLst>
+              <a:ext uri="{FF2B5EF4-FFF2-40B4-BE49-F238E27FC236}">
+                <a16:creationId xmlns:a16="http://schemas.microsoft.com/office/drawing/2014/main" id="{45A24646-3429-8847-A682-94E49DC8BB92}"/>
+              </a:ext>
+            </a:extLst>
+          </p:cNvPr>
+          <p:cNvSpPr>
+            <a:spLocks noGrp="1"/>
+          </p:cNvSpPr>
+          <p:nvPr>
+            <p:ph type="ctrTitle"/>
+          </p:nvPr>
+        </p:nvSpPr>
+        <p:spPr>
+          <a:xfrm>
+            <a:off x="1069848" y="1298448"/>
+            <a:ext cx="7315200" cy="914400"/>
+          </a:xfrm>
+        </p:spPr>
+        <p:txBody>
+          <a:bodyPr>
+            <a:normAutofit fontScale="90000"/>
+          </a:bodyPr>
+          <a:lstStyle/>
+          <a:p>
+            <a:r>
+              <a:rPr lang="en-US" dirty="0"/>
+              <a:t>Improving visits / spend</a:t>
+            </a:r>
+            <a:br>
+              <a:rPr lang="en-US" dirty="0"/>
+            </a:br>
+            <a:r>
+              <a:rPr lang="en-US" sz="4400" dirty="0"/>
+              <a:t>How could visits be improved?</a:t>
+            </a:r>
+          </a:p>
+        </p:txBody>
+      </p:sp>
+      <p:sp>
+        <p:nvSpPr>
+          <p:cNvPr id="3" name="Subtitle 2">
+            <a:extLst>
+              <a:ext uri="{FF2B5EF4-FFF2-40B4-BE49-F238E27FC236}">
+                <a16:creationId xmlns:a16="http://schemas.microsoft.com/office/drawing/2014/main" id="{F2AB0476-65A6-144D-9D00-6F94D146DCD2}"/>
+              </a:ext>
+            </a:extLst>
+          </p:cNvPr>
+          <p:cNvSpPr>
+            <a:spLocks noGrp="1"/>
+          </p:cNvSpPr>
+          <p:nvPr>
+            <p:ph type="subTitle" idx="1"/>
+          </p:nvPr>
+        </p:nvSpPr>
+        <p:spPr/>
+        <p:txBody>
+          <a:bodyPr/>
+          <a:lstStyle/>
+          <a:p>
+            <a:endParaRPr lang="en-US"/>
+          </a:p>
+        </p:txBody>
+      </p:sp>
+    </p:spTree>
+    <p:extLst>
+      <p:ext uri="{BB962C8B-B14F-4D97-AF65-F5344CB8AC3E}">
+        <p14:creationId xmlns:p14="http://schemas.microsoft.com/office/powerpoint/2010/main" val="1647205772"/>
+      </p:ext>
+    </p:extLst>
+  </p:cSld>
+  <p:clrMapOvr>
+    <a:masterClrMapping/>
+  </p:clrMapOvr>
+</p:sld>
+</file>
+
+<file path=ppt/slides/slide16.xml><?xml version="1.0" encoding="utf-8"?>
+<p:sld xmlns:a="http://schemas.openxmlformats.org/drawingml/2006/main" xmlns:r="http://schemas.openxmlformats.org/officeDocument/2006/relationships" xmlns:p="http://schemas.openxmlformats.org/presentationml/2006/main">
+  <p:cSld>
+    <p:spTree>
+      <p:nvGrpSpPr>
+        <p:cNvPr id="1" name=""/>
+        <p:cNvGrpSpPr/>
+        <p:nvPr/>
+      </p:nvGrpSpPr>
+      <p:grpSpPr>
+        <a:xfrm>
+          <a:off x="0" y="0"/>
+          <a:ext cx="0" cy="0"/>
+          <a:chOff x="0" y="0"/>
+          <a:chExt cx="0" cy="0"/>
+        </a:xfrm>
+      </p:grpSpPr>
+      <p:sp>
+        <p:nvSpPr>
+          <p:cNvPr id="2" name="Title 1">
+            <a:extLst>
+              <a:ext uri="{FF2B5EF4-FFF2-40B4-BE49-F238E27FC236}">
+                <a16:creationId xmlns:a16="http://schemas.microsoft.com/office/drawing/2014/main" id="{45A24646-3429-8847-A682-94E49DC8BB92}"/>
+              </a:ext>
+            </a:extLst>
+          </p:cNvPr>
+          <p:cNvSpPr>
+            <a:spLocks noGrp="1"/>
+          </p:cNvSpPr>
+          <p:nvPr>
+            <p:ph type="ctrTitle"/>
+          </p:nvPr>
+        </p:nvSpPr>
+        <p:spPr>
+          <a:xfrm>
+            <a:off x="1069848" y="1298448"/>
+            <a:ext cx="7315200" cy="914400"/>
+          </a:xfrm>
+        </p:spPr>
+        <p:txBody>
+          <a:bodyPr>
+            <a:noAutofit/>
+          </a:bodyPr>
+          <a:lstStyle/>
+          <a:p>
+            <a:r>
+              <a:rPr lang="en-US" sz="4400" dirty="0"/>
+              <a:t>Recommendations to company</a:t>
+            </a:r>
+          </a:p>
+        </p:txBody>
+      </p:sp>
+      <p:sp>
+        <p:nvSpPr>
+          <p:cNvPr id="3" name="Subtitle 2">
+            <a:extLst>
+              <a:ext uri="{FF2B5EF4-FFF2-40B4-BE49-F238E27FC236}">
+                <a16:creationId xmlns:a16="http://schemas.microsoft.com/office/drawing/2014/main" id="{F2AB0476-65A6-144D-9D00-6F94D146DCD2}"/>
+              </a:ext>
+            </a:extLst>
+          </p:cNvPr>
+          <p:cNvSpPr>
+            <a:spLocks noGrp="1"/>
+          </p:cNvSpPr>
+          <p:nvPr>
+            <p:ph type="subTitle" idx="1"/>
+          </p:nvPr>
+        </p:nvSpPr>
+        <p:spPr/>
+        <p:txBody>
+          <a:bodyPr/>
+          <a:lstStyle/>
+          <a:p>
+            <a:endParaRPr lang="en-US"/>
+          </a:p>
+        </p:txBody>
+      </p:sp>
+    </p:spTree>
+    <p:extLst>
+      <p:ext uri="{BB962C8B-B14F-4D97-AF65-F5344CB8AC3E}">
+        <p14:creationId xmlns:p14="http://schemas.microsoft.com/office/powerpoint/2010/main" val="536200534"/>
+      </p:ext>
+    </p:extLst>
+  </p:cSld>
+  <p:clrMapOvr>
+    <a:masterClrMapping/>
+  </p:clrMapOvr>
+</p:sld>
+</file>
+
+<file path=ppt/slides/slide17.xml><?xml version="1.0" encoding="utf-8"?>
+<p:sld xmlns:a="http://schemas.openxmlformats.org/drawingml/2006/main" xmlns:r="http://schemas.openxmlformats.org/officeDocument/2006/relationships" xmlns:p="http://schemas.openxmlformats.org/presentationml/2006/main">
+  <p:cSld>
+    <p:spTree>
+      <p:nvGrpSpPr>
+        <p:cNvPr id="1" name=""/>
+        <p:cNvGrpSpPr/>
+        <p:nvPr/>
+      </p:nvGrpSpPr>
+      <p:grpSpPr>
+        <a:xfrm>
+          <a:off x="0" y="0"/>
+          <a:ext cx="0" cy="0"/>
+          <a:chOff x="0" y="0"/>
+          <a:chExt cx="0" cy="0"/>
+        </a:xfrm>
+      </p:grpSpPr>
+      <p:sp>
+        <p:nvSpPr>
+          <p:cNvPr id="2" name="Title 1">
+            <a:extLst>
+              <a:ext uri="{FF2B5EF4-FFF2-40B4-BE49-F238E27FC236}">
+                <a16:creationId xmlns:a16="http://schemas.microsoft.com/office/drawing/2014/main" id="{45A24646-3429-8847-A682-94E49DC8BB92}"/>
+              </a:ext>
+            </a:extLst>
+          </p:cNvPr>
+          <p:cNvSpPr>
+            <a:spLocks noGrp="1"/>
+          </p:cNvSpPr>
+          <p:nvPr>
+            <p:ph type="ctrTitle"/>
+          </p:nvPr>
+        </p:nvSpPr>
+        <p:spPr>
+          <a:xfrm>
+            <a:off x="1069848" y="1298448"/>
+            <a:ext cx="7315200" cy="914400"/>
+          </a:xfrm>
+        </p:spPr>
+        <p:txBody>
+          <a:bodyPr>
             <a:noAutofit/>
           </a:bodyPr>
           <a:lstStyle/>
@@ -5164,7 +6624,7 @@
 </p:sld>
 </file>
 
-<file path=ppt/slides/slide12.xml><?xml version="1.0" encoding="utf-8"?>
+<file path=ppt/slides/slide18.xml><?xml version="1.0" encoding="utf-8"?>
 <p:sld xmlns:a="http://schemas.openxmlformats.org/drawingml/2006/main" xmlns:r="http://schemas.openxmlformats.org/officeDocument/2006/relationships" xmlns:p="http://schemas.openxmlformats.org/presentationml/2006/main">
   <p:cSld>
     <p:spTree>
@@ -5429,6 +6889,36 @@
           </a:p>
         </p:txBody>
       </p:sp>
+      <p:pic>
+        <p:nvPicPr>
+          <p:cNvPr id="4" name="Picture 3">
+            <a:extLst>
+              <a:ext uri="{FF2B5EF4-FFF2-40B4-BE49-F238E27FC236}">
+                <a16:creationId xmlns:a16="http://schemas.microsoft.com/office/drawing/2014/main" id="{16A79824-CEED-A847-9C7E-8D830B55422E}"/>
+              </a:ext>
+            </a:extLst>
+          </p:cNvPr>
+          <p:cNvPicPr>
+            <a:picLocks noChangeAspect="1"/>
+          </p:cNvPicPr>
+          <p:nvPr/>
+        </p:nvPicPr>
+        <p:blipFill>
+          <a:blip r:embed="rId3"/>
+          <a:stretch>
+            <a:fillRect/>
+          </a:stretch>
+        </p:blipFill>
+        <p:spPr>
+          <a:xfrm>
+            <a:off x="2312865" y="2716006"/>
+            <a:ext cx="4889500" cy="3016250"/>
+          </a:xfrm>
+          <a:prstGeom prst="rect">
+            <a:avLst/>
+          </a:prstGeom>
+        </p:spPr>
+      </p:pic>
     </p:spTree>
     <p:extLst>
       <p:ext uri="{BB962C8B-B14F-4D97-AF65-F5344CB8AC3E}">
@@ -5477,27 +6967,21 @@
         </p:nvSpPr>
         <p:spPr>
           <a:xfrm>
-            <a:off x="1069848" y="1298447"/>
-            <a:ext cx="7315200" cy="1136639"/>
+            <a:off x="1069848" y="1298448"/>
+            <a:ext cx="7315200" cy="914400"/>
           </a:xfrm>
         </p:spPr>
         <p:txBody>
           <a:bodyPr>
-            <a:normAutofit fontScale="90000"/>
+            <a:normAutofit/>
           </a:bodyPr>
           <a:lstStyle/>
           <a:p>
             <a:r>
               <a:rPr lang="en-US" dirty="0"/>
-              <a:t>Locations</a:t>
-            </a:r>
-            <a:br>
-              <a:rPr lang="en-US" dirty="0"/>
-            </a:br>
-            <a:r>
-              <a:rPr lang="en-US" sz="4400" dirty="0"/>
-              <a:t>Where do people go in Scotland?</a:t>
-            </a:r>
+              <a:t>Transport</a:t>
+            </a:r>
+            <a:endParaRPr lang="en-US" sz="4400" dirty="0"/>
           </a:p>
         </p:txBody>
       </p:sp>
@@ -5526,10 +7010,40 @@
           </a:p>
         </p:txBody>
       </p:sp>
+      <p:pic>
+        <p:nvPicPr>
+          <p:cNvPr id="4" name="Picture 3">
+            <a:extLst>
+              <a:ext uri="{FF2B5EF4-FFF2-40B4-BE49-F238E27FC236}">
+                <a16:creationId xmlns:a16="http://schemas.microsoft.com/office/drawing/2014/main" id="{BF3F8594-36D7-7C43-8A7D-0428FDB5A547}"/>
+              </a:ext>
+            </a:extLst>
+          </p:cNvPr>
+          <p:cNvPicPr>
+            <a:picLocks noChangeAspect="1"/>
+          </p:cNvPicPr>
+          <p:nvPr/>
+        </p:nvPicPr>
+        <p:blipFill>
+          <a:blip r:embed="rId3"/>
+          <a:stretch>
+            <a:fillRect/>
+          </a:stretch>
+        </p:blipFill>
+        <p:spPr>
+          <a:xfrm>
+            <a:off x="2055653" y="2288276"/>
+            <a:ext cx="5343590" cy="3296370"/>
+          </a:xfrm>
+          <a:prstGeom prst="rect">
+            <a:avLst/>
+          </a:prstGeom>
+        </p:spPr>
+      </p:pic>
     </p:spTree>
     <p:extLst>
       <p:ext uri="{BB962C8B-B14F-4D97-AF65-F5344CB8AC3E}">
-        <p14:creationId xmlns:p14="http://schemas.microsoft.com/office/powerpoint/2010/main" val="1035160441"/>
+        <p14:creationId xmlns:p14="http://schemas.microsoft.com/office/powerpoint/2010/main" val="309077693"/>
       </p:ext>
     </p:extLst>
   </p:cSld>
@@ -5575,7 +7089,7 @@
         <p:spPr>
           <a:xfrm>
             <a:off x="1069848" y="1298447"/>
-            <a:ext cx="7315200" cy="1842317"/>
+            <a:ext cx="7315200" cy="1136639"/>
           </a:xfrm>
         </p:spPr>
         <p:txBody>
@@ -5586,14 +7100,14 @@
           <a:p>
             <a:r>
               <a:rPr lang="en-US" dirty="0"/>
-              <a:t>Activities</a:t>
+              <a:t>Locations</a:t>
             </a:r>
             <a:br>
               <a:rPr lang="en-US" dirty="0"/>
             </a:br>
             <a:r>
               <a:rPr lang="en-US" sz="4400" dirty="0"/>
-              <a:t>What do people do when visiting Scotland?</a:t>
+              <a:t>Where do people go in Scotland?</a:t>
             </a:r>
           </a:p>
         </p:txBody>
@@ -5623,10 +7137,70 @@
           </a:p>
         </p:txBody>
       </p:sp>
+      <p:pic>
+        <p:nvPicPr>
+          <p:cNvPr id="4" name="Picture 3">
+            <a:extLst>
+              <a:ext uri="{FF2B5EF4-FFF2-40B4-BE49-F238E27FC236}">
+                <a16:creationId xmlns:a16="http://schemas.microsoft.com/office/drawing/2014/main" id="{57C3CC1D-690B-224B-ACF4-285F58BF3451}"/>
+              </a:ext>
+            </a:extLst>
+          </p:cNvPr>
+          <p:cNvPicPr>
+            <a:picLocks noChangeAspect="1"/>
+          </p:cNvPicPr>
+          <p:nvPr/>
+        </p:nvPicPr>
+        <p:blipFill>
+          <a:blip r:embed="rId3"/>
+          <a:stretch>
+            <a:fillRect/>
+          </a:stretch>
+        </p:blipFill>
+        <p:spPr>
+          <a:xfrm>
+            <a:off x="1069848" y="2695166"/>
+            <a:ext cx="3882684" cy="2395162"/>
+          </a:xfrm>
+          <a:prstGeom prst="rect">
+            <a:avLst/>
+          </a:prstGeom>
+        </p:spPr>
+      </p:pic>
+      <p:pic>
+        <p:nvPicPr>
+          <p:cNvPr id="6" name="Picture 5">
+            <a:extLst>
+              <a:ext uri="{FF2B5EF4-FFF2-40B4-BE49-F238E27FC236}">
+                <a16:creationId xmlns:a16="http://schemas.microsoft.com/office/drawing/2014/main" id="{21C29F8B-ECAA-B24F-826C-785F6904E350}"/>
+              </a:ext>
+            </a:extLst>
+          </p:cNvPr>
+          <p:cNvPicPr>
+            <a:picLocks noChangeAspect="1"/>
+          </p:cNvPicPr>
+          <p:nvPr/>
+        </p:nvPicPr>
+        <p:blipFill>
+          <a:blip r:embed="rId4"/>
+          <a:stretch>
+            <a:fillRect/>
+          </a:stretch>
+        </p:blipFill>
+        <p:spPr>
+          <a:xfrm>
+            <a:off x="5237324" y="2695166"/>
+            <a:ext cx="3882684" cy="2395162"/>
+          </a:xfrm>
+          <a:prstGeom prst="rect">
+            <a:avLst/>
+          </a:prstGeom>
+        </p:spPr>
+      </p:pic>
     </p:spTree>
     <p:extLst>
       <p:ext uri="{BB962C8B-B14F-4D97-AF65-F5344CB8AC3E}">
-        <p14:creationId xmlns:p14="http://schemas.microsoft.com/office/powerpoint/2010/main" val="609963615"/>
+        <p14:creationId xmlns:p14="http://schemas.microsoft.com/office/powerpoint/2010/main" val="1035160441"/>
       </p:ext>
     </p:extLst>
   </p:cSld>
@@ -5672,26 +7246,20 @@
         <p:spPr>
           <a:xfrm>
             <a:off x="1069848" y="1298448"/>
-            <a:ext cx="7315200" cy="1345362"/>
+            <a:ext cx="7315200" cy="914400"/>
           </a:xfrm>
         </p:spPr>
         <p:txBody>
           <a:bodyPr>
-            <a:normAutofit fontScale="90000"/>
+            <a:normAutofit/>
           </a:bodyPr>
           <a:lstStyle/>
           <a:p>
             <a:r>
               <a:rPr lang="en-US" dirty="0"/>
-              <a:t>Accommodation</a:t>
-            </a:r>
-            <a:br>
-              <a:rPr lang="en-US" dirty="0"/>
-            </a:br>
-            <a:r>
-              <a:rPr lang="en-US" sz="4400" dirty="0"/>
-              <a:t>Where do people stay in Scotland?</a:t>
-            </a:r>
+              <a:t>Locations</a:t>
+            </a:r>
+            <a:endParaRPr lang="en-US" sz="4400" dirty="0"/>
           </a:p>
         </p:txBody>
       </p:sp>
@@ -5720,10 +7288,40 @@
           </a:p>
         </p:txBody>
       </p:sp>
+      <p:pic>
+        <p:nvPicPr>
+          <p:cNvPr id="5" name="Picture 4">
+            <a:extLst>
+              <a:ext uri="{FF2B5EF4-FFF2-40B4-BE49-F238E27FC236}">
+                <a16:creationId xmlns:a16="http://schemas.microsoft.com/office/drawing/2014/main" id="{D63CD526-683F-6A46-B71A-082DA79AD510}"/>
+              </a:ext>
+            </a:extLst>
+          </p:cNvPr>
+          <p:cNvPicPr>
+            <a:picLocks noChangeAspect="1"/>
+          </p:cNvPicPr>
+          <p:nvPr/>
+        </p:nvPicPr>
+        <p:blipFill>
+          <a:blip r:embed="rId3"/>
+          <a:stretch>
+            <a:fillRect/>
+          </a:stretch>
+        </p:blipFill>
+        <p:spPr>
+          <a:xfrm>
+            <a:off x="2387147" y="2347082"/>
+            <a:ext cx="4680602" cy="2887384"/>
+          </a:xfrm>
+          <a:prstGeom prst="rect">
+            <a:avLst/>
+          </a:prstGeom>
+        </p:spPr>
+      </p:pic>
     </p:spTree>
     <p:extLst>
       <p:ext uri="{BB962C8B-B14F-4D97-AF65-F5344CB8AC3E}">
-        <p14:creationId xmlns:p14="http://schemas.microsoft.com/office/powerpoint/2010/main" val="4215023738"/>
+        <p14:creationId xmlns:p14="http://schemas.microsoft.com/office/powerpoint/2010/main" val="1640109871"/>
       </p:ext>
     </p:extLst>
   </p:cSld>
@@ -5769,7 +7367,7 @@
         <p:spPr>
           <a:xfrm>
             <a:off x="1069848" y="1298447"/>
-            <a:ext cx="7315200" cy="1822439"/>
+            <a:ext cx="7315200" cy="1269949"/>
           </a:xfrm>
         </p:spPr>
         <p:txBody>
@@ -5780,14 +7378,14 @@
           <a:p>
             <a:r>
               <a:rPr lang="en-US" dirty="0"/>
-              <a:t>Demographic</a:t>
+              <a:t>Activities</a:t>
             </a:r>
             <a:br>
               <a:rPr lang="en-US" dirty="0"/>
             </a:br>
             <a:r>
-              <a:rPr lang="en-US" sz="4400" dirty="0"/>
-              <a:t>What are the traits of people who visit Scotland?</a:t>
+              <a:rPr lang="en-US" sz="3600" dirty="0"/>
+              <a:t>What do people do when visiting Scotland?</a:t>
             </a:r>
           </a:p>
         </p:txBody>
@@ -5817,10 +7415,70 @@
           </a:p>
         </p:txBody>
       </p:sp>
+      <p:pic>
+        <p:nvPicPr>
+          <p:cNvPr id="4" name="Picture 3">
+            <a:extLst>
+              <a:ext uri="{FF2B5EF4-FFF2-40B4-BE49-F238E27FC236}">
+                <a16:creationId xmlns:a16="http://schemas.microsoft.com/office/drawing/2014/main" id="{102003FD-13F5-A645-B350-89676DEB0C07}"/>
+              </a:ext>
+            </a:extLst>
+          </p:cNvPr>
+          <p:cNvPicPr>
+            <a:picLocks noChangeAspect="1"/>
+          </p:cNvPicPr>
+          <p:nvPr/>
+        </p:nvPicPr>
+        <p:blipFill>
+          <a:blip r:embed="rId3"/>
+          <a:stretch>
+            <a:fillRect/>
+          </a:stretch>
+        </p:blipFill>
+        <p:spPr>
+          <a:xfrm>
+            <a:off x="1206500" y="2568396"/>
+            <a:ext cx="4037304" cy="2490545"/>
+          </a:xfrm>
+          <a:prstGeom prst="rect">
+            <a:avLst/>
+          </a:prstGeom>
+        </p:spPr>
+      </p:pic>
+      <p:pic>
+        <p:nvPicPr>
+          <p:cNvPr id="5" name="Picture 4">
+            <a:extLst>
+              <a:ext uri="{FF2B5EF4-FFF2-40B4-BE49-F238E27FC236}">
+                <a16:creationId xmlns:a16="http://schemas.microsoft.com/office/drawing/2014/main" id="{CFF93EAF-881D-574F-85D7-94CFCB8F68EC}"/>
+              </a:ext>
+            </a:extLst>
+          </p:cNvPr>
+          <p:cNvPicPr>
+            <a:picLocks noChangeAspect="1"/>
+          </p:cNvPicPr>
+          <p:nvPr/>
+        </p:nvPicPr>
+        <p:blipFill>
+          <a:blip r:embed="rId4"/>
+          <a:stretch>
+            <a:fillRect/>
+          </a:stretch>
+        </p:blipFill>
+        <p:spPr>
+          <a:xfrm>
+            <a:off x="5535905" y="2568396"/>
+            <a:ext cx="4037305" cy="2490545"/>
+          </a:xfrm>
+          <a:prstGeom prst="rect">
+            <a:avLst/>
+          </a:prstGeom>
+        </p:spPr>
+      </p:pic>
     </p:spTree>
     <p:extLst>
       <p:ext uri="{BB962C8B-B14F-4D97-AF65-F5344CB8AC3E}">
-        <p14:creationId xmlns:p14="http://schemas.microsoft.com/office/powerpoint/2010/main" val="576864141"/>
+        <p14:creationId xmlns:p14="http://schemas.microsoft.com/office/powerpoint/2010/main" val="609963615"/>
       </p:ext>
     </p:extLst>
   </p:cSld>
@@ -5866,7 +7524,7 @@
         <p:spPr>
           <a:xfrm>
             <a:off x="1069848" y="1298448"/>
-            <a:ext cx="7315200" cy="1792622"/>
+            <a:ext cx="7315200" cy="1345362"/>
           </a:xfrm>
         </p:spPr>
         <p:txBody>
@@ -5877,14 +7535,14 @@
           <a:p>
             <a:r>
               <a:rPr lang="en-US" dirty="0"/>
-              <a:t>Time</a:t>
+              <a:t>Accommodation</a:t>
             </a:r>
             <a:br>
               <a:rPr lang="en-US" dirty="0"/>
             </a:br>
             <a:r>
               <a:rPr lang="en-US" sz="4400" dirty="0"/>
-              <a:t>How have visits to Scotland changed over time?</a:t>
+              <a:t>Where do people stay in Scotland?</a:t>
             </a:r>
           </a:p>
         </p:txBody>
@@ -5914,10 +7572,40 @@
           </a:p>
         </p:txBody>
       </p:sp>
+      <p:pic>
+        <p:nvPicPr>
+          <p:cNvPr id="4" name="Picture 3">
+            <a:extLst>
+              <a:ext uri="{FF2B5EF4-FFF2-40B4-BE49-F238E27FC236}">
+                <a16:creationId xmlns:a16="http://schemas.microsoft.com/office/drawing/2014/main" id="{89EBEB71-EFE6-0C4D-8202-9FD22FE79773}"/>
+              </a:ext>
+            </a:extLst>
+          </p:cNvPr>
+          <p:cNvPicPr>
+            <a:picLocks noChangeAspect="1"/>
+          </p:cNvPicPr>
+          <p:nvPr/>
+        </p:nvPicPr>
+        <p:blipFill>
+          <a:blip r:embed="rId3"/>
+          <a:stretch>
+            <a:fillRect/>
+          </a:stretch>
+        </p:blipFill>
+        <p:spPr>
+          <a:xfrm>
+            <a:off x="1996125" y="2529284"/>
+            <a:ext cx="5462646" cy="3369814"/>
+          </a:xfrm>
+          <a:prstGeom prst="rect">
+            <a:avLst/>
+          </a:prstGeom>
+        </p:spPr>
+      </p:pic>
     </p:spTree>
     <p:extLst>
       <p:ext uri="{BB962C8B-B14F-4D97-AF65-F5344CB8AC3E}">
-        <p14:creationId xmlns:p14="http://schemas.microsoft.com/office/powerpoint/2010/main" val="2487231236"/>
+        <p14:creationId xmlns:p14="http://schemas.microsoft.com/office/powerpoint/2010/main" val="4215023738"/>
       </p:ext>
     </p:extLst>
   </p:cSld>
@@ -5968,21 +7656,15 @@
         </p:spPr>
         <p:txBody>
           <a:bodyPr>
-            <a:normAutofit fontScale="90000"/>
+            <a:normAutofit/>
           </a:bodyPr>
           <a:lstStyle/>
           <a:p>
             <a:r>
               <a:rPr lang="en-US" dirty="0"/>
-              <a:t>Improving visits / spend</a:t>
-            </a:r>
-            <a:br>
-              <a:rPr lang="en-US" dirty="0"/>
-            </a:br>
-            <a:r>
-              <a:rPr lang="en-US" sz="4400" dirty="0"/>
-              <a:t>How could visits be improved?</a:t>
-            </a:r>
+              <a:t>Accommodation</a:t>
+            </a:r>
+            <a:endParaRPr lang="en-US" sz="4400" dirty="0"/>
           </a:p>
         </p:txBody>
       </p:sp>
@@ -6011,10 +7693,40 @@
           </a:p>
         </p:txBody>
       </p:sp>
+      <p:pic>
+        <p:nvPicPr>
+          <p:cNvPr id="5" name="Picture 4">
+            <a:extLst>
+              <a:ext uri="{FF2B5EF4-FFF2-40B4-BE49-F238E27FC236}">
+                <a16:creationId xmlns:a16="http://schemas.microsoft.com/office/drawing/2014/main" id="{900E951A-9885-5249-AD21-4A6688E3B36C}"/>
+              </a:ext>
+            </a:extLst>
+          </p:cNvPr>
+          <p:cNvPicPr>
+            <a:picLocks noChangeAspect="1"/>
+          </p:cNvPicPr>
+          <p:nvPr/>
+        </p:nvPicPr>
+        <p:blipFill>
+          <a:blip r:embed="rId3"/>
+          <a:stretch>
+            <a:fillRect/>
+          </a:stretch>
+        </p:blipFill>
+        <p:spPr>
+          <a:xfrm>
+            <a:off x="2132473" y="2212848"/>
+            <a:ext cx="5250284" cy="3238812"/>
+          </a:xfrm>
+          <a:prstGeom prst="rect">
+            <a:avLst/>
+          </a:prstGeom>
+        </p:spPr>
+      </p:pic>
     </p:spTree>
     <p:extLst>
       <p:ext uri="{BB962C8B-B14F-4D97-AF65-F5344CB8AC3E}">
-        <p14:creationId xmlns:p14="http://schemas.microsoft.com/office/powerpoint/2010/main" val="1647205772"/>
+        <p14:creationId xmlns:p14="http://schemas.microsoft.com/office/powerpoint/2010/main" val="4217788369"/>
       </p:ext>
     </p:extLst>
   </p:cSld>

</xml_diff>